<commit_message>
Change power point resolution to 16:9
</commit_message>
<xml_diff>
--- a/AAQC - Autonomous air quality control.pptx
+++ b/AAQC - Autonomous air quality control.pptx
@@ -14,11 +14,11 @@
     <p:sldId id="259" r:id="rId5"/>
     <p:sldId id="261" r:id="rId6"/>
     <p:sldId id="264" r:id="rId7"/>
-    <p:sldId id="260" r:id="rId8"/>
-    <p:sldId id="263" r:id="rId9"/>
+    <p:sldId id="263" r:id="rId8"/>
+    <p:sldId id="260" r:id="rId9"/>
     <p:sldId id="262" r:id="rId10"/>
   </p:sldIdLst>
-  <p:sldSz cx="9144000" cy="6858000" type="screen4x3"/>
+  <p:sldSz cx="12192000" cy="6858000"/>
   <p:notesSz cx="6858000" cy="9144000"/>
   <p:defaultTextStyle>
     <a:defPPr>
@@ -115,6 +115,22 @@
       </a:defRPr>
     </a:lvl9pPr>
   </p:defaultTextStyle>
+  <p:extLst>
+    <p:ext uri="{EFAFB233-063F-42B5-8137-9DF3F51BA10A}">
+      <p15:sldGuideLst xmlns:p15="http://schemas.microsoft.com/office/powerpoint/2012/main">
+        <p15:guide id="1" orient="horz" pos="2160" userDrawn="1">
+          <p15:clr>
+            <a:srgbClr val="A4A3A4"/>
+          </p15:clr>
+        </p15:guide>
+        <p15:guide id="2" pos="3840" userDrawn="1">
+          <p15:clr>
+            <a:srgbClr val="A4A3A4"/>
+          </p15:clr>
+        </p15:guide>
+      </p15:sldGuideLst>
+    </p:ext>
+  </p:extLst>
 </p:presentation>
 </file>
 
@@ -218,8 +234,8 @@
         </p:nvSpPr>
         <p:spPr>
           <a:xfrm>
-            <a:off x="1143000" y="685800"/>
-            <a:ext cx="4572000" cy="3429000"/>
+            <a:off x="381000" y="685800"/>
+            <a:ext cx="6096000" cy="3429000"/>
           </a:xfrm>
           <a:prstGeom prst="rect">
             <a:avLst/>
@@ -264,35 +280,35 @@
           <a:p>
             <a:pPr lvl="0"/>
             <a:r>
-              <a:rPr lang="de-DE" smtClean="0"/>
+              <a:rPr lang="de-DE"/>
               <a:t>Textmasterformat bearbeiten</a:t>
             </a:r>
           </a:p>
           <a:p>
             <a:pPr lvl="1"/>
             <a:r>
-              <a:rPr lang="de-DE" smtClean="0"/>
+              <a:rPr lang="de-DE"/>
               <a:t>Zweite Ebene</a:t>
             </a:r>
           </a:p>
           <a:p>
             <a:pPr lvl="2"/>
             <a:r>
-              <a:rPr lang="de-DE" smtClean="0"/>
+              <a:rPr lang="de-DE"/>
               <a:t>Dritte Ebene</a:t>
             </a:r>
           </a:p>
           <a:p>
             <a:pPr lvl="3"/>
             <a:r>
-              <a:rPr lang="de-DE" smtClean="0"/>
+              <a:rPr lang="de-DE"/>
               <a:t>Vierte Ebene</a:t>
             </a:r>
           </a:p>
           <a:p>
             <a:pPr lvl="4"/>
             <a:r>
-              <a:rPr lang="de-DE" smtClean="0"/>
+              <a:rPr lang="de-DE"/>
               <a:t>Fünfte Ebene</a:t>
             </a:r>
             <a:endParaRPr lang="en-US"/>
@@ -495,7 +511,12 @@
             <p:ph type="sldImg"/>
           </p:nvPr>
         </p:nvSpPr>
-        <p:spPr/>
+        <p:spPr>
+          <a:xfrm>
+            <a:off x="381000" y="685800"/>
+            <a:ext cx="6096000" cy="3429000"/>
+          </a:xfrm>
+        </p:spPr>
       </p:sp>
       <p:sp>
         <p:nvSpPr>
@@ -513,10 +534,9 @@
           <a:lstStyle/>
           <a:p>
             <a:r>
-              <a:rPr lang="en-US" dirty="0" smtClean="0"/>
+              <a:rPr lang="en-US" dirty="0"/>
               <a:t>Inside / outside</a:t>
             </a:r>
-            <a:endParaRPr lang="en-US" dirty="0"/>
           </a:p>
         </p:txBody>
       </p:sp>
@@ -583,7 +603,12 @@
             <p:ph type="sldImg"/>
           </p:nvPr>
         </p:nvSpPr>
-        <p:spPr/>
+        <p:spPr>
+          <a:xfrm>
+            <a:off x="381000" y="685800"/>
+            <a:ext cx="6096000" cy="3429000"/>
+          </a:xfrm>
+        </p:spPr>
       </p:sp>
       <p:sp>
         <p:nvSpPr>
@@ -621,7 +646,7 @@
           <a:p>
             <a:fld id="{174BD370-52F2-400C-A6E7-787A47EB17DB}" type="slidenum">
               <a:rPr lang="en-US" smtClean="0"/>
-              <a:t>7</a:t>
+              <a:t>8</a:t>
             </a:fld>
             <a:endParaRPr lang="en-US"/>
           </a:p>
@@ -669,8 +694,8 @@
         </p:nvSpPr>
         <p:spPr>
           <a:xfrm>
-            <a:off x="685800" y="2130425"/>
-            <a:ext cx="7772400" cy="1470025"/>
+            <a:off x="914400" y="2130428"/>
+            <a:ext cx="10363200" cy="1470025"/>
           </a:xfrm>
         </p:spPr>
         <p:txBody>
@@ -678,7 +703,7 @@
           <a:lstStyle/>
           <a:p>
             <a:r>
-              <a:rPr lang="de-DE" smtClean="0"/>
+              <a:rPr lang="de-DE"/>
               <a:t>Titelmasterformat durch Klicken bearbeiten</a:t>
             </a:r>
             <a:endParaRPr lang="en-US"/>
@@ -697,8 +722,8 @@
         </p:nvSpPr>
         <p:spPr>
           <a:xfrm>
-            <a:off x="1371600" y="3886200"/>
-            <a:ext cx="6400800" cy="1752600"/>
+            <a:off x="1828800" y="3886200"/>
+            <a:ext cx="8534400" cy="1752600"/>
           </a:xfrm>
         </p:spPr>
         <p:txBody>
@@ -797,7 +822,7 @@
           </a:lstStyle>
           <a:p>
             <a:r>
-              <a:rPr lang="de-DE" smtClean="0"/>
+              <a:rPr lang="de-DE"/>
               <a:t>Formatvorlage des Untertitelmasters durch Klicken bearbeiten</a:t>
             </a:r>
             <a:endParaRPr lang="en-US"/>
@@ -915,7 +940,7 @@
           <a:lstStyle/>
           <a:p>
             <a:r>
-              <a:rPr lang="de-DE" smtClean="0"/>
+              <a:rPr lang="de-DE"/>
               <a:t>Titelmasterformat durch Klicken bearbeiten</a:t>
             </a:r>
             <a:endParaRPr lang="en-US"/>
@@ -939,35 +964,35 @@
           <a:p>
             <a:pPr lvl="0"/>
             <a:r>
-              <a:rPr lang="de-DE" smtClean="0"/>
+              <a:rPr lang="de-DE"/>
               <a:t>Textmasterformat bearbeiten</a:t>
             </a:r>
           </a:p>
           <a:p>
             <a:pPr lvl="1"/>
             <a:r>
-              <a:rPr lang="de-DE" smtClean="0"/>
+              <a:rPr lang="de-DE"/>
               <a:t>Zweite Ebene</a:t>
             </a:r>
           </a:p>
           <a:p>
             <a:pPr lvl="2"/>
             <a:r>
-              <a:rPr lang="de-DE" smtClean="0"/>
+              <a:rPr lang="de-DE"/>
               <a:t>Dritte Ebene</a:t>
             </a:r>
           </a:p>
           <a:p>
             <a:pPr lvl="3"/>
             <a:r>
-              <a:rPr lang="de-DE" smtClean="0"/>
+              <a:rPr lang="de-DE"/>
               <a:t>Vierte Ebene</a:t>
             </a:r>
           </a:p>
           <a:p>
             <a:pPr lvl="4"/>
             <a:r>
-              <a:rPr lang="de-DE" smtClean="0"/>
+              <a:rPr lang="de-DE"/>
               <a:t>Fünfte Ebene</a:t>
             </a:r>
             <a:endParaRPr lang="en-US"/>
@@ -1081,8 +1106,8 @@
         </p:nvSpPr>
         <p:spPr>
           <a:xfrm>
-            <a:off x="6629400" y="274638"/>
-            <a:ext cx="2057400" cy="5851525"/>
+            <a:off x="8839200" y="274641"/>
+            <a:ext cx="2743200" cy="5851525"/>
           </a:xfrm>
         </p:spPr>
         <p:txBody>
@@ -1090,7 +1115,7 @@
           <a:lstStyle/>
           <a:p>
             <a:r>
-              <a:rPr lang="de-DE" smtClean="0"/>
+              <a:rPr lang="de-DE"/>
               <a:t>Titelmasterformat durch Klicken bearbeiten</a:t>
             </a:r>
             <a:endParaRPr lang="en-US"/>
@@ -1109,8 +1134,8 @@
         </p:nvSpPr>
         <p:spPr>
           <a:xfrm>
-            <a:off x="457200" y="274638"/>
-            <a:ext cx="6019800" cy="5851525"/>
+            <a:off x="609600" y="274641"/>
+            <a:ext cx="8026400" cy="5851525"/>
           </a:xfrm>
         </p:spPr>
         <p:txBody>
@@ -1119,35 +1144,35 @@
           <a:p>
             <a:pPr lvl="0"/>
             <a:r>
-              <a:rPr lang="de-DE" smtClean="0"/>
+              <a:rPr lang="de-DE"/>
               <a:t>Textmasterformat bearbeiten</a:t>
             </a:r>
           </a:p>
           <a:p>
             <a:pPr lvl="1"/>
             <a:r>
-              <a:rPr lang="de-DE" smtClean="0"/>
+              <a:rPr lang="de-DE"/>
               <a:t>Zweite Ebene</a:t>
             </a:r>
           </a:p>
           <a:p>
             <a:pPr lvl="2"/>
             <a:r>
-              <a:rPr lang="de-DE" smtClean="0"/>
+              <a:rPr lang="de-DE"/>
               <a:t>Dritte Ebene</a:t>
             </a:r>
           </a:p>
           <a:p>
             <a:pPr lvl="3"/>
             <a:r>
-              <a:rPr lang="de-DE" smtClean="0"/>
+              <a:rPr lang="de-DE"/>
               <a:t>Vierte Ebene</a:t>
             </a:r>
           </a:p>
           <a:p>
             <a:pPr lvl="4"/>
             <a:r>
-              <a:rPr lang="de-DE" smtClean="0"/>
+              <a:rPr lang="de-DE"/>
               <a:t>Fünfte Ebene</a:t>
             </a:r>
             <a:endParaRPr lang="en-US"/>
@@ -1265,7 +1290,7 @@
           <a:lstStyle/>
           <a:p>
             <a:r>
-              <a:rPr lang="de-DE" smtClean="0"/>
+              <a:rPr lang="de-DE"/>
               <a:t>Titelmasterformat durch Klicken bearbeiten</a:t>
             </a:r>
             <a:endParaRPr lang="en-US"/>
@@ -1289,35 +1314,35 @@
           <a:p>
             <a:pPr lvl="0"/>
             <a:r>
-              <a:rPr lang="de-DE" smtClean="0"/>
+              <a:rPr lang="de-DE"/>
               <a:t>Textmasterformat bearbeiten</a:t>
             </a:r>
           </a:p>
           <a:p>
             <a:pPr lvl="1"/>
             <a:r>
-              <a:rPr lang="de-DE" smtClean="0"/>
+              <a:rPr lang="de-DE"/>
               <a:t>Zweite Ebene</a:t>
             </a:r>
           </a:p>
           <a:p>
             <a:pPr lvl="2"/>
             <a:r>
-              <a:rPr lang="de-DE" smtClean="0"/>
+              <a:rPr lang="de-DE"/>
               <a:t>Dritte Ebene</a:t>
             </a:r>
           </a:p>
           <a:p>
             <a:pPr lvl="3"/>
             <a:r>
-              <a:rPr lang="de-DE" smtClean="0"/>
+              <a:rPr lang="de-DE"/>
               <a:t>Vierte Ebene</a:t>
             </a:r>
           </a:p>
           <a:p>
             <a:pPr lvl="4"/>
             <a:r>
-              <a:rPr lang="de-DE" smtClean="0"/>
+              <a:rPr lang="de-DE"/>
               <a:t>Fünfte Ebene</a:t>
             </a:r>
             <a:endParaRPr lang="en-US"/>
@@ -1431,8 +1456,8 @@
         </p:nvSpPr>
         <p:spPr>
           <a:xfrm>
-            <a:off x="722313" y="4406900"/>
-            <a:ext cx="7772400" cy="1362075"/>
+            <a:off x="963084" y="4406903"/>
+            <a:ext cx="10363200" cy="1362075"/>
           </a:xfrm>
         </p:spPr>
         <p:txBody>
@@ -1444,7 +1469,7 @@
           </a:lstStyle>
           <a:p>
             <a:r>
-              <a:rPr lang="de-DE" smtClean="0"/>
+              <a:rPr lang="de-DE"/>
               <a:t>Titelmasterformat durch Klicken bearbeiten</a:t>
             </a:r>
             <a:endParaRPr lang="en-US"/>
@@ -1463,8 +1488,8 @@
         </p:nvSpPr>
         <p:spPr>
           <a:xfrm>
-            <a:off x="722313" y="2906713"/>
-            <a:ext cx="7772400" cy="1500187"/>
+            <a:off x="963084" y="2906713"/>
+            <a:ext cx="10363200" cy="1500187"/>
           </a:xfrm>
         </p:spPr>
         <p:txBody>
@@ -1564,7 +1589,7 @@
           <a:p>
             <a:pPr lvl="0"/>
             <a:r>
-              <a:rPr lang="de-DE" smtClean="0"/>
+              <a:rPr lang="de-DE"/>
               <a:t>Textmasterformat bearbeiten</a:t>
             </a:r>
           </a:p>
@@ -1681,7 +1706,7 @@
           <a:lstStyle/>
           <a:p>
             <a:r>
-              <a:rPr lang="de-DE" smtClean="0"/>
+              <a:rPr lang="de-DE"/>
               <a:t>Titelmasterformat durch Klicken bearbeiten</a:t>
             </a:r>
             <a:endParaRPr lang="en-US"/>
@@ -1700,8 +1725,8 @@
         </p:nvSpPr>
         <p:spPr>
           <a:xfrm>
-            <a:off x="457200" y="1600200"/>
-            <a:ext cx="4038600" cy="4525963"/>
+            <a:off x="609600" y="1600203"/>
+            <a:ext cx="5384800" cy="4525963"/>
           </a:xfrm>
         </p:spPr>
         <p:txBody>
@@ -1738,35 +1763,35 @@
           <a:p>
             <a:pPr lvl="0"/>
             <a:r>
-              <a:rPr lang="de-DE" smtClean="0"/>
+              <a:rPr lang="de-DE"/>
               <a:t>Textmasterformat bearbeiten</a:t>
             </a:r>
           </a:p>
           <a:p>
             <a:pPr lvl="1"/>
             <a:r>
-              <a:rPr lang="de-DE" smtClean="0"/>
+              <a:rPr lang="de-DE"/>
               <a:t>Zweite Ebene</a:t>
             </a:r>
           </a:p>
           <a:p>
             <a:pPr lvl="2"/>
             <a:r>
-              <a:rPr lang="de-DE" smtClean="0"/>
+              <a:rPr lang="de-DE"/>
               <a:t>Dritte Ebene</a:t>
             </a:r>
           </a:p>
           <a:p>
             <a:pPr lvl="3"/>
             <a:r>
-              <a:rPr lang="de-DE" smtClean="0"/>
+              <a:rPr lang="de-DE"/>
               <a:t>Vierte Ebene</a:t>
             </a:r>
           </a:p>
           <a:p>
             <a:pPr lvl="4"/>
             <a:r>
-              <a:rPr lang="de-DE" smtClean="0"/>
+              <a:rPr lang="de-DE"/>
               <a:t>Fünfte Ebene</a:t>
             </a:r>
             <a:endParaRPr lang="en-US"/>
@@ -1785,8 +1810,8 @@
         </p:nvSpPr>
         <p:spPr>
           <a:xfrm>
-            <a:off x="4648200" y="1600200"/>
-            <a:ext cx="4038600" cy="4525963"/>
+            <a:off x="6197600" y="1600203"/>
+            <a:ext cx="5384800" cy="4525963"/>
           </a:xfrm>
         </p:spPr>
         <p:txBody>
@@ -1823,35 +1848,35 @@
           <a:p>
             <a:pPr lvl="0"/>
             <a:r>
-              <a:rPr lang="de-DE" smtClean="0"/>
+              <a:rPr lang="de-DE"/>
               <a:t>Textmasterformat bearbeiten</a:t>
             </a:r>
           </a:p>
           <a:p>
             <a:pPr lvl="1"/>
             <a:r>
-              <a:rPr lang="de-DE" smtClean="0"/>
+              <a:rPr lang="de-DE"/>
               <a:t>Zweite Ebene</a:t>
             </a:r>
           </a:p>
           <a:p>
             <a:pPr lvl="2"/>
             <a:r>
-              <a:rPr lang="de-DE" smtClean="0"/>
+              <a:rPr lang="de-DE"/>
               <a:t>Dritte Ebene</a:t>
             </a:r>
           </a:p>
           <a:p>
             <a:pPr lvl="3"/>
             <a:r>
-              <a:rPr lang="de-DE" smtClean="0"/>
+              <a:rPr lang="de-DE"/>
               <a:t>Vierte Ebene</a:t>
             </a:r>
           </a:p>
           <a:p>
             <a:pPr lvl="4"/>
             <a:r>
-              <a:rPr lang="de-DE" smtClean="0"/>
+              <a:rPr lang="de-DE"/>
               <a:t>Fünfte Ebene</a:t>
             </a:r>
             <a:endParaRPr lang="en-US"/>
@@ -1973,7 +1998,7 @@
           </a:lstStyle>
           <a:p>
             <a:r>
-              <a:rPr lang="de-DE" smtClean="0"/>
+              <a:rPr lang="de-DE"/>
               <a:t>Titelmasterformat durch Klicken bearbeiten</a:t>
             </a:r>
             <a:endParaRPr lang="en-US"/>
@@ -1992,8 +2017,8 @@
         </p:nvSpPr>
         <p:spPr>
           <a:xfrm>
-            <a:off x="457200" y="1535113"/>
-            <a:ext cx="4040188" cy="639762"/>
+            <a:off x="609600" y="1535113"/>
+            <a:ext cx="5386917" cy="639762"/>
           </a:xfrm>
         </p:spPr>
         <p:txBody>
@@ -2039,7 +2064,7 @@
           <a:p>
             <a:pPr lvl="0"/>
             <a:r>
-              <a:rPr lang="de-DE" smtClean="0"/>
+              <a:rPr lang="de-DE"/>
               <a:t>Textmasterformat bearbeiten</a:t>
             </a:r>
           </a:p>
@@ -2057,8 +2082,8 @@
         </p:nvSpPr>
         <p:spPr>
           <a:xfrm>
-            <a:off x="457200" y="2174875"/>
-            <a:ext cx="4040188" cy="3951288"/>
+            <a:off x="609600" y="2174875"/>
+            <a:ext cx="5386917" cy="3951288"/>
           </a:xfrm>
         </p:spPr>
         <p:txBody>
@@ -2095,35 +2120,35 @@
           <a:p>
             <a:pPr lvl="0"/>
             <a:r>
-              <a:rPr lang="de-DE" smtClean="0"/>
+              <a:rPr lang="de-DE"/>
               <a:t>Textmasterformat bearbeiten</a:t>
             </a:r>
           </a:p>
           <a:p>
             <a:pPr lvl="1"/>
             <a:r>
-              <a:rPr lang="de-DE" smtClean="0"/>
+              <a:rPr lang="de-DE"/>
               <a:t>Zweite Ebene</a:t>
             </a:r>
           </a:p>
           <a:p>
             <a:pPr lvl="2"/>
             <a:r>
-              <a:rPr lang="de-DE" smtClean="0"/>
+              <a:rPr lang="de-DE"/>
               <a:t>Dritte Ebene</a:t>
             </a:r>
           </a:p>
           <a:p>
             <a:pPr lvl="3"/>
             <a:r>
-              <a:rPr lang="de-DE" smtClean="0"/>
+              <a:rPr lang="de-DE"/>
               <a:t>Vierte Ebene</a:t>
             </a:r>
           </a:p>
           <a:p>
             <a:pPr lvl="4"/>
             <a:r>
-              <a:rPr lang="de-DE" smtClean="0"/>
+              <a:rPr lang="de-DE"/>
               <a:t>Fünfte Ebene</a:t>
             </a:r>
             <a:endParaRPr lang="en-US"/>
@@ -2142,8 +2167,8 @@
         </p:nvSpPr>
         <p:spPr>
           <a:xfrm>
-            <a:off x="4645025" y="1535113"/>
-            <a:ext cx="4041775" cy="639762"/>
+            <a:off x="6193369" y="1535113"/>
+            <a:ext cx="5389033" cy="639762"/>
           </a:xfrm>
         </p:spPr>
         <p:txBody>
@@ -2189,7 +2214,7 @@
           <a:p>
             <a:pPr lvl="0"/>
             <a:r>
-              <a:rPr lang="de-DE" smtClean="0"/>
+              <a:rPr lang="de-DE"/>
               <a:t>Textmasterformat bearbeiten</a:t>
             </a:r>
           </a:p>
@@ -2207,8 +2232,8 @@
         </p:nvSpPr>
         <p:spPr>
           <a:xfrm>
-            <a:off x="4645025" y="2174875"/>
-            <a:ext cx="4041775" cy="3951288"/>
+            <a:off x="6193369" y="2174875"/>
+            <a:ext cx="5389033" cy="3951288"/>
           </a:xfrm>
         </p:spPr>
         <p:txBody>
@@ -2245,35 +2270,35 @@
           <a:p>
             <a:pPr lvl="0"/>
             <a:r>
-              <a:rPr lang="de-DE" smtClean="0"/>
+              <a:rPr lang="de-DE"/>
               <a:t>Textmasterformat bearbeiten</a:t>
             </a:r>
           </a:p>
           <a:p>
             <a:pPr lvl="1"/>
             <a:r>
-              <a:rPr lang="de-DE" smtClean="0"/>
+              <a:rPr lang="de-DE"/>
               <a:t>Zweite Ebene</a:t>
             </a:r>
           </a:p>
           <a:p>
             <a:pPr lvl="2"/>
             <a:r>
-              <a:rPr lang="de-DE" smtClean="0"/>
+              <a:rPr lang="de-DE"/>
               <a:t>Dritte Ebene</a:t>
             </a:r>
           </a:p>
           <a:p>
             <a:pPr lvl="3"/>
             <a:r>
-              <a:rPr lang="de-DE" smtClean="0"/>
+              <a:rPr lang="de-DE"/>
               <a:t>Vierte Ebene</a:t>
             </a:r>
           </a:p>
           <a:p>
             <a:pPr lvl="4"/>
             <a:r>
-              <a:rPr lang="de-DE" smtClean="0"/>
+              <a:rPr lang="de-DE"/>
               <a:t>Fünfte Ebene</a:t>
             </a:r>
             <a:endParaRPr lang="en-US"/>
@@ -2391,7 +2416,7 @@
           <a:lstStyle/>
           <a:p>
             <a:r>
-              <a:rPr lang="de-DE" smtClean="0"/>
+              <a:rPr lang="de-DE"/>
               <a:t>Titelmasterformat durch Klicken bearbeiten</a:t>
             </a:r>
             <a:endParaRPr lang="en-US"/>
@@ -2600,8 +2625,8 @@
         </p:nvSpPr>
         <p:spPr>
           <a:xfrm>
-            <a:off x="457200" y="273050"/>
-            <a:ext cx="3008313" cy="1162050"/>
+            <a:off x="609602" y="273050"/>
+            <a:ext cx="4011084" cy="1162050"/>
           </a:xfrm>
         </p:spPr>
         <p:txBody>
@@ -2613,7 +2638,7 @@
           </a:lstStyle>
           <a:p>
             <a:r>
-              <a:rPr lang="de-DE" smtClean="0"/>
+              <a:rPr lang="de-DE"/>
               <a:t>Titelmasterformat durch Klicken bearbeiten</a:t>
             </a:r>
             <a:endParaRPr lang="en-US"/>
@@ -2632,8 +2657,8 @@
         </p:nvSpPr>
         <p:spPr>
           <a:xfrm>
-            <a:off x="3575050" y="273050"/>
-            <a:ext cx="5111750" cy="5853113"/>
+            <a:off x="4766733" y="273053"/>
+            <a:ext cx="6815667" cy="5853113"/>
           </a:xfrm>
         </p:spPr>
         <p:txBody>
@@ -2670,35 +2695,35 @@
           <a:p>
             <a:pPr lvl="0"/>
             <a:r>
-              <a:rPr lang="de-DE" smtClean="0"/>
+              <a:rPr lang="de-DE"/>
               <a:t>Textmasterformat bearbeiten</a:t>
             </a:r>
           </a:p>
           <a:p>
             <a:pPr lvl="1"/>
             <a:r>
-              <a:rPr lang="de-DE" smtClean="0"/>
+              <a:rPr lang="de-DE"/>
               <a:t>Zweite Ebene</a:t>
             </a:r>
           </a:p>
           <a:p>
             <a:pPr lvl="2"/>
             <a:r>
-              <a:rPr lang="de-DE" smtClean="0"/>
+              <a:rPr lang="de-DE"/>
               <a:t>Dritte Ebene</a:t>
             </a:r>
           </a:p>
           <a:p>
             <a:pPr lvl="3"/>
             <a:r>
-              <a:rPr lang="de-DE" smtClean="0"/>
+              <a:rPr lang="de-DE"/>
               <a:t>Vierte Ebene</a:t>
             </a:r>
           </a:p>
           <a:p>
             <a:pPr lvl="4"/>
             <a:r>
-              <a:rPr lang="de-DE" smtClean="0"/>
+              <a:rPr lang="de-DE"/>
               <a:t>Fünfte Ebene</a:t>
             </a:r>
             <a:endParaRPr lang="en-US"/>
@@ -2717,8 +2742,8 @@
         </p:nvSpPr>
         <p:spPr>
           <a:xfrm>
-            <a:off x="457200" y="1435100"/>
-            <a:ext cx="3008313" cy="4691063"/>
+            <a:off x="609602" y="1435103"/>
+            <a:ext cx="4011084" cy="4691063"/>
           </a:xfrm>
         </p:spPr>
         <p:txBody>
@@ -2764,7 +2789,7 @@
           <a:p>
             <a:pPr lvl="0"/>
             <a:r>
-              <a:rPr lang="de-DE" smtClean="0"/>
+              <a:rPr lang="de-DE"/>
               <a:t>Textmasterformat bearbeiten</a:t>
             </a:r>
           </a:p>
@@ -2877,8 +2902,8 @@
         </p:nvSpPr>
         <p:spPr>
           <a:xfrm>
-            <a:off x="1792288" y="4800600"/>
-            <a:ext cx="5486400" cy="566738"/>
+            <a:off x="2389717" y="4800600"/>
+            <a:ext cx="7315200" cy="566738"/>
           </a:xfrm>
         </p:spPr>
         <p:txBody>
@@ -2890,7 +2915,7 @@
           </a:lstStyle>
           <a:p>
             <a:r>
-              <a:rPr lang="de-DE" smtClean="0"/>
+              <a:rPr lang="de-DE"/>
               <a:t>Titelmasterformat durch Klicken bearbeiten</a:t>
             </a:r>
             <a:endParaRPr lang="en-US"/>
@@ -2909,8 +2934,8 @@
         </p:nvSpPr>
         <p:spPr>
           <a:xfrm>
-            <a:off x="1792288" y="612775"/>
-            <a:ext cx="5486400" cy="4114800"/>
+            <a:off x="2389717" y="612775"/>
+            <a:ext cx="7315200" cy="4114800"/>
           </a:xfrm>
         </p:spPr>
         <p:txBody>
@@ -2970,8 +2995,8 @@
         </p:nvSpPr>
         <p:spPr>
           <a:xfrm>
-            <a:off x="1792288" y="5367338"/>
-            <a:ext cx="5486400" cy="804862"/>
+            <a:off x="2389717" y="5367338"/>
+            <a:ext cx="7315200" cy="804862"/>
           </a:xfrm>
         </p:spPr>
         <p:txBody>
@@ -3017,7 +3042,7 @@
           <a:p>
             <a:pPr lvl="0"/>
             <a:r>
-              <a:rPr lang="de-DE" smtClean="0"/>
+              <a:rPr lang="de-DE"/>
               <a:t>Textmasterformat bearbeiten</a:t>
             </a:r>
           </a:p>
@@ -3135,8 +3160,8 @@
         </p:nvSpPr>
         <p:spPr>
           <a:xfrm>
-            <a:off x="457200" y="274638"/>
-            <a:ext cx="8229600" cy="1143000"/>
+            <a:off x="609600" y="274638"/>
+            <a:ext cx="10972800" cy="1143000"/>
           </a:xfrm>
           <a:prstGeom prst="rect">
             <a:avLst/>
@@ -3149,7 +3174,7 @@
           <a:lstStyle/>
           <a:p>
             <a:r>
-              <a:rPr lang="de-DE" smtClean="0"/>
+              <a:rPr lang="de-DE"/>
               <a:t>Titelmasterformat durch Klicken bearbeiten</a:t>
             </a:r>
             <a:endParaRPr lang="en-US"/>
@@ -3168,8 +3193,8 @@
         </p:nvSpPr>
         <p:spPr>
           <a:xfrm>
-            <a:off x="457200" y="1600200"/>
-            <a:ext cx="8229600" cy="4525963"/>
+            <a:off x="609600" y="1600203"/>
+            <a:ext cx="10972800" cy="4525963"/>
           </a:xfrm>
           <a:prstGeom prst="rect">
             <a:avLst/>
@@ -3183,35 +3208,35 @@
           <a:p>
             <a:pPr lvl="0"/>
             <a:r>
-              <a:rPr lang="de-DE" smtClean="0"/>
+              <a:rPr lang="de-DE"/>
               <a:t>Textmasterformat bearbeiten</a:t>
             </a:r>
           </a:p>
           <a:p>
             <a:pPr lvl="1"/>
             <a:r>
-              <a:rPr lang="de-DE" smtClean="0"/>
+              <a:rPr lang="de-DE"/>
               <a:t>Zweite Ebene</a:t>
             </a:r>
           </a:p>
           <a:p>
             <a:pPr lvl="2"/>
             <a:r>
-              <a:rPr lang="de-DE" smtClean="0"/>
+              <a:rPr lang="de-DE"/>
               <a:t>Dritte Ebene</a:t>
             </a:r>
           </a:p>
           <a:p>
             <a:pPr lvl="3"/>
             <a:r>
-              <a:rPr lang="de-DE" smtClean="0"/>
+              <a:rPr lang="de-DE"/>
               <a:t>Vierte Ebene</a:t>
             </a:r>
           </a:p>
           <a:p>
             <a:pPr lvl="4"/>
             <a:r>
-              <a:rPr lang="de-DE" smtClean="0"/>
+              <a:rPr lang="de-DE"/>
               <a:t>Fünfte Ebene</a:t>
             </a:r>
             <a:endParaRPr lang="en-US"/>
@@ -3230,8 +3255,8 @@
         </p:nvSpPr>
         <p:spPr>
           <a:xfrm>
-            <a:off x="457200" y="6356350"/>
-            <a:ext cx="2133600" cy="365125"/>
+            <a:off x="609600" y="6356353"/>
+            <a:ext cx="2844800" cy="365125"/>
           </a:xfrm>
           <a:prstGeom prst="rect">
             <a:avLst/>
@@ -3271,8 +3296,8 @@
         </p:nvSpPr>
         <p:spPr>
           <a:xfrm>
-            <a:off x="3124200" y="6356350"/>
-            <a:ext cx="2895600" cy="365125"/>
+            <a:off x="4165600" y="6356353"/>
+            <a:ext cx="3860800" cy="365125"/>
           </a:xfrm>
           <a:prstGeom prst="rect">
             <a:avLst/>
@@ -3308,8 +3333,8 @@
         </p:nvSpPr>
         <p:spPr>
           <a:xfrm>
-            <a:off x="6553200" y="6356350"/>
-            <a:ext cx="2133600" cy="365125"/>
+            <a:off x="8737600" y="6356353"/>
+            <a:ext cx="2844800" cy="365125"/>
           </a:xfrm>
           <a:prstGeom prst="rect">
             <a:avLst/>
@@ -3667,21 +3692,8 @@
           <a:p>
             <a:r>
               <a:rPr lang="en-US" dirty="0"/>
-              <a:t>Group 16 - Tobias Haller, Jonas Hofer, and Christian </a:t>
-            </a:r>
-            <a:r>
-              <a:rPr lang="en-US" dirty="0" smtClean="0"/>
-              <a:t>M</a:t>
-            </a:r>
-            <a:r>
-              <a:rPr lang="en-US" dirty="0"/>
-              <a:t>ü</a:t>
-            </a:r>
-            <a:r>
-              <a:rPr lang="en-US" dirty="0" smtClean="0"/>
-              <a:t>ller</a:t>
-            </a:r>
-            <a:endParaRPr lang="en-US" dirty="0"/>
+              <a:t>Group 16 - Tobias Haller, Jonas Hofer, and Christian Müller</a:t>
+            </a:r>
           </a:p>
         </p:txBody>
       </p:sp>
@@ -3741,7 +3753,7 @@
         </p:nvSpPr>
         <p:spPr>
           <a:xfrm>
-            <a:off x="0" y="6492875"/>
+            <a:off x="1524000" y="6492878"/>
             <a:ext cx="2895600" cy="365125"/>
           </a:xfrm>
         </p:spPr>
@@ -3806,10 +3818,9 @@
           <a:lstStyle/>
           <a:p>
             <a:r>
-              <a:rPr lang="en-US" dirty="0" smtClean="0"/>
+              <a:rPr lang="en-US" dirty="0"/>
               <a:t>Sensors</a:t>
             </a:r>
-            <a:endParaRPr lang="en-US" dirty="0"/>
           </a:p>
         </p:txBody>
       </p:sp>
@@ -3829,43 +3840,36 @@
           <a:lstStyle/>
           <a:p>
             <a:r>
-              <a:rPr lang="en-US" dirty="0" smtClean="0"/>
+              <a:rPr lang="en-US" dirty="0"/>
               <a:t>Humidity (outside)</a:t>
             </a:r>
-            <a:endParaRPr lang="en-US" dirty="0" smtClean="0"/>
-          </a:p>
-          <a:p>
-            <a:r>
-              <a:rPr lang="en-US" dirty="0" smtClean="0"/>
+          </a:p>
+          <a:p>
+            <a:r>
+              <a:rPr lang="en-US" dirty="0"/>
               <a:t>Temperature (inside and outside)</a:t>
             </a:r>
-            <a:endParaRPr lang="en-US" dirty="0" smtClean="0"/>
-          </a:p>
-          <a:p>
-            <a:r>
-              <a:rPr lang="en-US" dirty="0" smtClean="0"/>
+          </a:p>
+          <a:p>
+            <a:r>
+              <a:rPr lang="en-US" dirty="0"/>
               <a:t>CO</a:t>
             </a:r>
             <a:r>
-              <a:rPr lang="en-US" baseline="-25000" dirty="0" smtClean="0"/>
+              <a:rPr lang="en-US" baseline="-25000" dirty="0"/>
               <a:t>2 </a:t>
             </a:r>
             <a:r>
-              <a:rPr lang="en-US" dirty="0" smtClean="0"/>
+              <a:rPr lang="en-US" dirty="0"/>
               <a:t>(inside)</a:t>
             </a:r>
-            <a:endParaRPr lang="en-US" baseline="-25000" dirty="0" smtClean="0"/>
-          </a:p>
-          <a:p>
-            <a:r>
-              <a:rPr lang="en-US" dirty="0" smtClean="0"/>
-              <a:t>Particulate </a:t>
-            </a:r>
-            <a:r>
-              <a:rPr lang="en-US" dirty="0" smtClean="0"/>
-              <a:t>matter (inside and outside)</a:t>
-            </a:r>
-            <a:endParaRPr lang="en-US" dirty="0"/>
+            <a:endParaRPr lang="en-US" baseline="-25000" dirty="0"/>
+          </a:p>
+          <a:p>
+            <a:r>
+              <a:rPr lang="en-US" dirty="0"/>
+              <a:t>Particulate matter (inside and outside)</a:t>
+            </a:r>
           </a:p>
         </p:txBody>
       </p:sp>
@@ -3915,10 +3919,9 @@
           <a:lstStyle/>
           <a:p>
             <a:r>
-              <a:rPr lang="en-US" dirty="0" smtClean="0"/>
+              <a:rPr lang="en-US" dirty="0"/>
               <a:t>Actuators</a:t>
             </a:r>
-            <a:endParaRPr lang="en-US" dirty="0"/>
           </a:p>
         </p:txBody>
       </p:sp>
@@ -3938,25 +3941,25 @@
           <a:lstStyle/>
           <a:p>
             <a:r>
-              <a:rPr lang="en-US" dirty="0" smtClean="0"/>
+              <a:rPr lang="en-US" dirty="0"/>
               <a:t>Air-conditioning</a:t>
             </a:r>
           </a:p>
           <a:p>
             <a:r>
-              <a:rPr lang="en-US" dirty="0" smtClean="0"/>
+              <a:rPr lang="en-US" dirty="0"/>
               <a:t>Heater</a:t>
             </a:r>
           </a:p>
           <a:p>
             <a:r>
-              <a:rPr lang="en-US" dirty="0" smtClean="0"/>
+              <a:rPr lang="en-US" dirty="0"/>
               <a:t>Ventilation</a:t>
             </a:r>
           </a:p>
           <a:p>
             <a:r>
-              <a:rPr lang="en-US" dirty="0" smtClean="0"/>
+              <a:rPr lang="en-US" dirty="0"/>
               <a:t>Air-purifier</a:t>
             </a:r>
           </a:p>
@@ -4008,10 +4011,9 @@
           <a:lstStyle/>
           <a:p>
             <a:r>
-              <a:rPr lang="en-US" dirty="0" smtClean="0"/>
+              <a:rPr lang="en-US" dirty="0"/>
               <a:t>Architecture</a:t>
             </a:r>
-            <a:endParaRPr lang="en-US" dirty="0"/>
           </a:p>
         </p:txBody>
       </p:sp>
@@ -4039,7 +4041,7 @@
         </p:blipFill>
         <p:spPr>
           <a:xfrm>
-            <a:off x="523145" y="1600200"/>
+            <a:off x="2047148" y="1600203"/>
             <a:ext cx="8097709" cy="4525963"/>
           </a:xfrm>
         </p:spPr>
@@ -4090,10 +4092,9 @@
           <a:lstStyle/>
           <a:p>
             <a:r>
-              <a:rPr lang="en-US" dirty="0" smtClean="0"/>
+              <a:rPr lang="en-US" dirty="0"/>
               <a:t>Demo setup</a:t>
             </a:r>
-            <a:endParaRPr lang="en-US" dirty="0"/>
           </a:p>
         </p:txBody>
       </p:sp>
@@ -4121,7 +4122,7 @@
         </p:blipFill>
         <p:spPr>
           <a:xfrm>
-            <a:off x="2222171" y="1600200"/>
+            <a:off x="3746174" y="1600203"/>
             <a:ext cx="4699657" cy="4525963"/>
           </a:xfrm>
         </p:spPr>
@@ -4140,6 +4141,77 @@
 </file>
 
 <file path=ppt/slides/slide7.xml><?xml version="1.0" encoding="utf-8"?>
+<p:sld xmlns:a="http://schemas.openxmlformats.org/drawingml/2006/main" xmlns:r="http://schemas.openxmlformats.org/officeDocument/2006/relationships" xmlns:p="http://schemas.openxmlformats.org/presentationml/2006/main">
+  <p:cSld>
+    <p:spTree>
+      <p:nvGrpSpPr>
+        <p:cNvPr id="1" name=""/>
+        <p:cNvGrpSpPr/>
+        <p:nvPr/>
+      </p:nvGrpSpPr>
+      <p:grpSpPr>
+        <a:xfrm>
+          <a:off x="0" y="0"/>
+          <a:ext cx="0" cy="0"/>
+          <a:chOff x="0" y="0"/>
+          <a:chExt cx="0" cy="0"/>
+        </a:xfrm>
+      </p:grpSpPr>
+      <p:sp>
+        <p:nvSpPr>
+          <p:cNvPr id="2" name="Titel 1"/>
+          <p:cNvSpPr>
+            <a:spLocks noGrp="1"/>
+          </p:cNvSpPr>
+          <p:nvPr>
+            <p:ph type="title"/>
+          </p:nvPr>
+        </p:nvSpPr>
+        <p:spPr/>
+        <p:txBody>
+          <a:bodyPr/>
+          <a:lstStyle/>
+          <a:p>
+            <a:r>
+              <a:rPr lang="en-US" dirty="0"/>
+              <a:t>AAQC - Live Demo</a:t>
+            </a:r>
+          </a:p>
+        </p:txBody>
+      </p:sp>
+      <p:sp>
+        <p:nvSpPr>
+          <p:cNvPr id="3" name="Inhaltsplatzhalter 2"/>
+          <p:cNvSpPr>
+            <a:spLocks noGrp="1"/>
+          </p:cNvSpPr>
+          <p:nvPr>
+            <p:ph idx="1"/>
+          </p:nvPr>
+        </p:nvSpPr>
+        <p:spPr/>
+        <p:txBody>
+          <a:bodyPr/>
+          <a:lstStyle/>
+          <a:p>
+            <a:endParaRPr lang="en-US" dirty="0"/>
+          </a:p>
+        </p:txBody>
+      </p:sp>
+    </p:spTree>
+    <p:extLst>
+      <p:ext uri="{BB962C8B-B14F-4D97-AF65-F5344CB8AC3E}">
+        <p14:creationId xmlns:p14="http://schemas.microsoft.com/office/powerpoint/2010/main" val="2079069635"/>
+      </p:ext>
+    </p:extLst>
+  </p:cSld>
+  <p:clrMapOvr>
+    <a:masterClrMapping/>
+  </p:clrMapOvr>
+</p:sld>
+</file>
+
+<file path=ppt/slides/slide8.xml><?xml version="1.0" encoding="utf-8"?>
 <p:sld xmlns:a="http://schemas.openxmlformats.org/drawingml/2006/main" xmlns:r="http://schemas.openxmlformats.org/officeDocument/2006/relationships" xmlns:p="http://schemas.openxmlformats.org/presentationml/2006/main" show="0">
   <p:cSld>
     <p:spTree>
@@ -4172,14 +4244,13 @@
           <a:lstStyle/>
           <a:p>
             <a:r>
-              <a:rPr lang="en-US" dirty="0" err="1" smtClean="0"/>
+              <a:rPr lang="en-US" dirty="0" err="1"/>
               <a:t>IoT</a:t>
             </a:r>
             <a:r>
-              <a:rPr lang="en-US" dirty="0" smtClean="0"/>
+              <a:rPr lang="en-US" dirty="0"/>
               <a:t> AI Planning Model</a:t>
             </a:r>
-            <a:endParaRPr lang="en-US" dirty="0"/>
           </a:p>
         </p:txBody>
       </p:sp>
@@ -4207,7 +4278,7 @@
         </p:blipFill>
         <p:spPr>
           <a:xfrm>
-            <a:off x="764866" y="1600200"/>
+            <a:off x="2288869" y="1600203"/>
             <a:ext cx="7614267" cy="4525963"/>
           </a:xfrm>
         </p:spPr>
@@ -4216,90 +4287,6 @@
     <p:extLst>
       <p:ext uri="{BB962C8B-B14F-4D97-AF65-F5344CB8AC3E}">
         <p14:creationId xmlns:p14="http://schemas.microsoft.com/office/powerpoint/2010/main" val="643104511"/>
-      </p:ext>
-    </p:extLst>
-  </p:cSld>
-  <p:clrMapOvr>
-    <a:masterClrMapping/>
-  </p:clrMapOvr>
-  <mc:AlternateContent xmlns:mc="http://schemas.openxmlformats.org/markup-compatibility/2006">
-    <mc:Choice xmlns:p14="http://schemas.microsoft.com/office/powerpoint/2010/main" Requires="p14">
-      <p:transition spd="slow" p14:dur="2000"/>
-    </mc:Choice>
-    <mc:Fallback>
-      <p:transition spd="slow"/>
-    </mc:Fallback>
-  </mc:AlternateContent>
-</p:sld>
-</file>
-
-<file path=ppt/slides/slide8.xml><?xml version="1.0" encoding="utf-8"?>
-<p:sld xmlns:a="http://schemas.openxmlformats.org/drawingml/2006/main" xmlns:r="http://schemas.openxmlformats.org/officeDocument/2006/relationships" xmlns:p="http://schemas.openxmlformats.org/presentationml/2006/main">
-  <p:cSld>
-    <p:spTree>
-      <p:nvGrpSpPr>
-        <p:cNvPr id="1" name=""/>
-        <p:cNvGrpSpPr/>
-        <p:nvPr/>
-      </p:nvGrpSpPr>
-      <p:grpSpPr>
-        <a:xfrm>
-          <a:off x="0" y="0"/>
-          <a:ext cx="0" cy="0"/>
-          <a:chOff x="0" y="0"/>
-          <a:chExt cx="0" cy="0"/>
-        </a:xfrm>
-      </p:grpSpPr>
-      <p:sp>
-        <p:nvSpPr>
-          <p:cNvPr id="2" name="Titel 1"/>
-          <p:cNvSpPr>
-            <a:spLocks noGrp="1"/>
-          </p:cNvSpPr>
-          <p:nvPr>
-            <p:ph type="title"/>
-          </p:nvPr>
-        </p:nvSpPr>
-        <p:spPr/>
-        <p:txBody>
-          <a:bodyPr/>
-          <a:lstStyle/>
-          <a:p>
-            <a:r>
-              <a:rPr lang="en-US" dirty="0"/>
-              <a:t>AAQC </a:t>
-            </a:r>
-            <a:r>
-              <a:rPr lang="en-US" dirty="0" smtClean="0"/>
-              <a:t>- Live Demo</a:t>
-            </a:r>
-            <a:endParaRPr lang="en-US" dirty="0"/>
-          </a:p>
-        </p:txBody>
-      </p:sp>
-      <p:sp>
-        <p:nvSpPr>
-          <p:cNvPr id="3" name="Inhaltsplatzhalter 2"/>
-          <p:cNvSpPr>
-            <a:spLocks noGrp="1"/>
-          </p:cNvSpPr>
-          <p:nvPr>
-            <p:ph idx="1"/>
-          </p:nvPr>
-        </p:nvSpPr>
-        <p:spPr/>
-        <p:txBody>
-          <a:bodyPr/>
-          <a:lstStyle/>
-          <a:p>
-            <a:endParaRPr lang="en-US" dirty="0"/>
-          </a:p>
-        </p:txBody>
-      </p:sp>
-    </p:spTree>
-    <p:extLst>
-      <p:ext uri="{BB962C8B-B14F-4D97-AF65-F5344CB8AC3E}">
-        <p14:creationId xmlns:p14="http://schemas.microsoft.com/office/powerpoint/2010/main" val="2079069635"/>
       </p:ext>
     </p:extLst>
   </p:cSld>
@@ -4342,10 +4329,9 @@
           <a:lstStyle/>
           <a:p>
             <a:r>
-              <a:rPr lang="en-US" dirty="0" smtClean="0"/>
+              <a:rPr lang="en-US" dirty="0"/>
               <a:t>System design</a:t>
             </a:r>
-            <a:endParaRPr lang="en-US" dirty="0"/>
           </a:p>
         </p:txBody>
       </p:sp>
@@ -4373,7 +4359,7 @@
         </p:blipFill>
         <p:spPr>
           <a:xfrm>
-            <a:off x="2355535" y="1600200"/>
+            <a:off x="3879538" y="1600203"/>
             <a:ext cx="4432929" cy="4525963"/>
           </a:xfrm>
         </p:spPr>
@@ -4388,14 +4374,6 @@
   <p:clrMapOvr>
     <a:masterClrMapping/>
   </p:clrMapOvr>
-  <mc:AlternateContent xmlns:mc="http://schemas.openxmlformats.org/markup-compatibility/2006" xmlns:p14="http://schemas.microsoft.com/office/powerpoint/2010/main">
-    <mc:Choice Requires="p14">
-      <p:transition spd="slow" p14:dur="2000"/>
-    </mc:Choice>
-    <mc:Fallback xmlns="">
-      <p:transition spd="slow"/>
-    </mc:Fallback>
-  </mc:AlternateContent>
 </p:sld>
 </file>
 

</xml_diff>